<commit_message>
week 1 and 2 slide updates for Jim
</commit_message>
<xml_diff>
--- a/slides/Week1_21.pptx
+++ b/slides/Week1_21.pptx
@@ -674,10 +674,10 @@
           </a:ln>
           <a:extLst>
             <a:ext uri="{FAA26D3D-D897-4be2-8F04-BA451C77F1D7}">
-              <ma14:placeholderFlag xmlns="" xmlns:ma14="http://schemas.microsoft.com/office/mac/drawingml/2011/main" val="1"/>
+              <ma14:placeholderFlag xmlns:ma14="http://schemas.microsoft.com/office/mac/drawingml/2011/main" xmlns="" val="1"/>
             </a:ext>
             <a:ext uri="{909E8E84-426E-40dd-AFC4-6F175D3DCCD1}">
-              <a14:hiddenFill xmlns:a14="http://schemas.microsoft.com/office/drawing/2010/main" xmlns="">
+              <a14:hiddenFill xmlns="" xmlns:a14="http://schemas.microsoft.com/office/drawing/2010/main">
                 <a:solidFill>
                   <a:srgbClr val="FFFFFF"/>
                 </a:solidFill>
@@ -1210,14 +1210,14 @@
           <a:ln/>
           <a:extLst>
             <a:ext uri="{909E8E84-426E-40dd-AFC4-6F175D3DCCD1}">
-              <a14:hiddenFill xmlns:a14="http://schemas.microsoft.com/office/drawing/2010/main" xmlns="">
+              <a14:hiddenFill xmlns="" xmlns:a14="http://schemas.microsoft.com/office/drawing/2010/main">
                 <a:solidFill>
                   <a:srgbClr val="FFFFFF"/>
                 </a:solidFill>
               </a14:hiddenFill>
             </a:ext>
             <a:ext uri="{91240B29-F687-4f45-9708-019B960494DF}">
-              <a14:hiddenLine xmlns:a14="http://schemas.microsoft.com/office/drawing/2010/main" xmlns="" w="9525">
+              <a14:hiddenLine xmlns="" xmlns:a14="http://schemas.microsoft.com/office/drawing/2010/main" w="9525">
                 <a:solidFill>
                   <a:srgbClr val="000000"/>
                 </a:solidFill>
@@ -1377,17 +1377,17 @@
           <a:ln/>
           <a:extLst>
             <a:ext uri="{FAA26D3D-D897-4be2-8F04-BA451C77F1D7}">
-              <ma14:placeholderFlag xmlns="" xmlns:ma14="http://schemas.microsoft.com/office/mac/drawingml/2011/main" val="1"/>
+              <ma14:placeholderFlag xmlns:ma14="http://schemas.microsoft.com/office/mac/drawingml/2011/main" xmlns="" val="1"/>
             </a:ext>
             <a:ext uri="{909E8E84-426E-40dd-AFC4-6F175D3DCCD1}">
-              <a14:hiddenFill xmlns:a14="http://schemas.microsoft.com/office/drawing/2010/main" xmlns="">
+              <a14:hiddenFill xmlns="" xmlns:a14="http://schemas.microsoft.com/office/drawing/2010/main">
                 <a:solidFill>
                   <a:srgbClr val="FFFFFF"/>
                 </a:solidFill>
               </a14:hiddenFill>
             </a:ext>
             <a:ext uri="{91240B29-F687-4f45-9708-019B960494DF}">
-              <a14:hiddenLine xmlns:a14="http://schemas.microsoft.com/office/drawing/2010/main" xmlns="" w="9525">
+              <a14:hiddenLine xmlns="" xmlns:a14="http://schemas.microsoft.com/office/drawing/2010/main" w="9525">
                 <a:solidFill>
                   <a:srgbClr val="000000"/>
                 </a:solidFill>
@@ -1450,14 +1450,14 @@
           <a:ln/>
           <a:extLst>
             <a:ext uri="{909E8E84-426E-40dd-AFC4-6F175D3DCCD1}">
-              <a14:hiddenFill xmlns:a14="http://schemas.microsoft.com/office/drawing/2010/main" xmlns="">
+              <a14:hiddenFill xmlns="" xmlns:a14="http://schemas.microsoft.com/office/drawing/2010/main">
                 <a:solidFill>
                   <a:srgbClr val="FFFFFF"/>
                 </a:solidFill>
               </a14:hiddenFill>
             </a:ext>
             <a:ext uri="{91240B29-F687-4f45-9708-019B960494DF}">
-              <a14:hiddenLine xmlns:a14="http://schemas.microsoft.com/office/drawing/2010/main" xmlns="" w="9525">
+              <a14:hiddenLine xmlns="" xmlns:a14="http://schemas.microsoft.com/office/drawing/2010/main" w="9525">
                 <a:solidFill>
                   <a:srgbClr val="000000"/>
                 </a:solidFill>
@@ -1617,14 +1617,14 @@
           <a:ln/>
           <a:extLst>
             <a:ext uri="{909E8E84-426E-40dd-AFC4-6F175D3DCCD1}">
-              <a14:hiddenFill xmlns:a14="http://schemas.microsoft.com/office/drawing/2010/main" xmlns="">
+              <a14:hiddenFill xmlns="" xmlns:a14="http://schemas.microsoft.com/office/drawing/2010/main">
                 <a:solidFill>
                   <a:srgbClr val="FFFFFF"/>
                 </a:solidFill>
               </a14:hiddenFill>
             </a:ext>
             <a:ext uri="{91240B29-F687-4f45-9708-019B960494DF}">
-              <a14:hiddenLine xmlns:a14="http://schemas.microsoft.com/office/drawing/2010/main" xmlns="" w="9525">
+              <a14:hiddenLine xmlns="" xmlns:a14="http://schemas.microsoft.com/office/drawing/2010/main" w="9525">
                 <a:solidFill>
                   <a:srgbClr val="000000"/>
                 </a:solidFill>
@@ -1771,14 +1771,14 @@
           <a:ln/>
           <a:extLst>
             <a:ext uri="{909E8E84-426E-40dd-AFC4-6F175D3DCCD1}">
-              <a14:hiddenFill xmlns:a14="http://schemas.microsoft.com/office/drawing/2010/main" xmlns="">
+              <a14:hiddenFill xmlns="" xmlns:a14="http://schemas.microsoft.com/office/drawing/2010/main">
                 <a:solidFill>
                   <a:srgbClr val="FFFFFF"/>
                 </a:solidFill>
               </a14:hiddenFill>
             </a:ext>
             <a:ext uri="{91240B29-F687-4f45-9708-019B960494DF}">
-              <a14:hiddenLine xmlns:a14="http://schemas.microsoft.com/office/drawing/2010/main" xmlns="" w="9525">
+              <a14:hiddenLine xmlns="" xmlns:a14="http://schemas.microsoft.com/office/drawing/2010/main" w="9525">
                 <a:solidFill>
                   <a:srgbClr val="000000"/>
                 </a:solidFill>
@@ -1938,17 +1938,17 @@
           <a:ln/>
           <a:extLst>
             <a:ext uri="{FAA26D3D-D897-4be2-8F04-BA451C77F1D7}">
-              <ma14:placeholderFlag xmlns="" xmlns:ma14="http://schemas.microsoft.com/office/mac/drawingml/2011/main" val="1"/>
+              <ma14:placeholderFlag xmlns:ma14="http://schemas.microsoft.com/office/mac/drawingml/2011/main" xmlns="" val="1"/>
             </a:ext>
             <a:ext uri="{909E8E84-426E-40dd-AFC4-6F175D3DCCD1}">
-              <a14:hiddenFill xmlns:a14="http://schemas.microsoft.com/office/drawing/2010/main" xmlns="">
+              <a14:hiddenFill xmlns="" xmlns:a14="http://schemas.microsoft.com/office/drawing/2010/main">
                 <a:solidFill>
                   <a:srgbClr val="FFFFFF"/>
                 </a:solidFill>
               </a14:hiddenFill>
             </a:ext>
             <a:ext uri="{91240B29-F687-4f45-9708-019B960494DF}">
-              <a14:hiddenLine xmlns:a14="http://schemas.microsoft.com/office/drawing/2010/main" xmlns="" w="9525">
+              <a14:hiddenLine xmlns="" xmlns:a14="http://schemas.microsoft.com/office/drawing/2010/main" w="9525">
                 <a:solidFill>
                   <a:srgbClr val="000000"/>
                 </a:solidFill>
@@ -2011,14 +2011,14 @@
           <a:ln/>
           <a:extLst>
             <a:ext uri="{909E8E84-426E-40dd-AFC4-6F175D3DCCD1}">
-              <a14:hiddenFill xmlns:a14="http://schemas.microsoft.com/office/drawing/2010/main" xmlns="">
+              <a14:hiddenFill xmlns="" xmlns:a14="http://schemas.microsoft.com/office/drawing/2010/main">
                 <a:solidFill>
                   <a:srgbClr val="FFFFFF"/>
                 </a:solidFill>
               </a14:hiddenFill>
             </a:ext>
             <a:ext uri="{91240B29-F687-4f45-9708-019B960494DF}">
-              <a14:hiddenLine xmlns:a14="http://schemas.microsoft.com/office/drawing/2010/main" xmlns="" w="9525">
+              <a14:hiddenLine xmlns="" xmlns:a14="http://schemas.microsoft.com/office/drawing/2010/main" w="9525">
                 <a:solidFill>
                   <a:srgbClr val="000000"/>
                 </a:solidFill>
@@ -2178,17 +2178,17 @@
           <a:ln/>
           <a:extLst>
             <a:ext uri="{FAA26D3D-D897-4be2-8F04-BA451C77F1D7}">
-              <ma14:placeholderFlag xmlns="" xmlns:ma14="http://schemas.microsoft.com/office/mac/drawingml/2011/main" val="1"/>
+              <ma14:placeholderFlag xmlns:ma14="http://schemas.microsoft.com/office/mac/drawingml/2011/main" xmlns="" val="1"/>
             </a:ext>
             <a:ext uri="{909E8E84-426E-40dd-AFC4-6F175D3DCCD1}">
-              <a14:hiddenFill xmlns:a14="http://schemas.microsoft.com/office/drawing/2010/main" xmlns="">
+              <a14:hiddenFill xmlns="" xmlns:a14="http://schemas.microsoft.com/office/drawing/2010/main">
                 <a:solidFill>
                   <a:srgbClr val="FFFFFF"/>
                 </a:solidFill>
               </a14:hiddenFill>
             </a:ext>
             <a:ext uri="{91240B29-F687-4f45-9708-019B960494DF}">
-              <a14:hiddenLine xmlns:a14="http://schemas.microsoft.com/office/drawing/2010/main" xmlns="" w="9525">
+              <a14:hiddenLine xmlns="" xmlns:a14="http://schemas.microsoft.com/office/drawing/2010/main" w="9525">
                 <a:solidFill>
                   <a:srgbClr val="000000"/>
                 </a:solidFill>
@@ -2251,14 +2251,14 @@
           <a:ln/>
           <a:extLst>
             <a:ext uri="{909E8E84-426E-40dd-AFC4-6F175D3DCCD1}">
-              <a14:hiddenFill xmlns:a14="http://schemas.microsoft.com/office/drawing/2010/main" xmlns="">
+              <a14:hiddenFill xmlns="" xmlns:a14="http://schemas.microsoft.com/office/drawing/2010/main">
                 <a:solidFill>
                   <a:srgbClr val="FFFFFF"/>
                 </a:solidFill>
               </a14:hiddenFill>
             </a:ext>
             <a:ext uri="{91240B29-F687-4f45-9708-019B960494DF}">
-              <a14:hiddenLine xmlns:a14="http://schemas.microsoft.com/office/drawing/2010/main" xmlns="" w="9525">
+              <a14:hiddenLine xmlns="" xmlns:a14="http://schemas.microsoft.com/office/drawing/2010/main" w="9525">
                 <a:solidFill>
                   <a:srgbClr val="000000"/>
                 </a:solidFill>
@@ -2418,17 +2418,17 @@
           <a:ln/>
           <a:extLst>
             <a:ext uri="{FAA26D3D-D897-4be2-8F04-BA451C77F1D7}">
-              <ma14:placeholderFlag xmlns="" xmlns:ma14="http://schemas.microsoft.com/office/mac/drawingml/2011/main" val="1"/>
+              <ma14:placeholderFlag xmlns:ma14="http://schemas.microsoft.com/office/mac/drawingml/2011/main" xmlns="" val="1"/>
             </a:ext>
             <a:ext uri="{909E8E84-426E-40dd-AFC4-6F175D3DCCD1}">
-              <a14:hiddenFill xmlns:a14="http://schemas.microsoft.com/office/drawing/2010/main" xmlns="">
+              <a14:hiddenFill xmlns="" xmlns:a14="http://schemas.microsoft.com/office/drawing/2010/main">
                 <a:solidFill>
                   <a:srgbClr val="FFFFFF"/>
                 </a:solidFill>
               </a14:hiddenFill>
             </a:ext>
             <a:ext uri="{91240B29-F687-4f45-9708-019B960494DF}">
-              <a14:hiddenLine xmlns:a14="http://schemas.microsoft.com/office/drawing/2010/main" xmlns="" w="9525">
+              <a14:hiddenLine xmlns="" xmlns:a14="http://schemas.microsoft.com/office/drawing/2010/main" w="9525">
                 <a:solidFill>
                   <a:srgbClr val="000000"/>
                 </a:solidFill>
@@ -2491,14 +2491,14 @@
           <a:ln/>
           <a:extLst>
             <a:ext uri="{909E8E84-426E-40dd-AFC4-6F175D3DCCD1}">
-              <a14:hiddenFill xmlns:a14="http://schemas.microsoft.com/office/drawing/2010/main" xmlns="">
+              <a14:hiddenFill xmlns="" xmlns:a14="http://schemas.microsoft.com/office/drawing/2010/main">
                 <a:solidFill>
                   <a:srgbClr val="FFFFFF"/>
                 </a:solidFill>
               </a14:hiddenFill>
             </a:ext>
             <a:ext uri="{91240B29-F687-4f45-9708-019B960494DF}">
-              <a14:hiddenLine xmlns:a14="http://schemas.microsoft.com/office/drawing/2010/main" xmlns="" w="9525">
+              <a14:hiddenLine xmlns="" xmlns:a14="http://schemas.microsoft.com/office/drawing/2010/main" w="9525">
                 <a:solidFill>
                   <a:srgbClr val="000000"/>
                 </a:solidFill>
@@ -2658,17 +2658,17 @@
           <a:ln/>
           <a:extLst>
             <a:ext uri="{FAA26D3D-D897-4be2-8F04-BA451C77F1D7}">
-              <ma14:placeholderFlag xmlns="" xmlns:ma14="http://schemas.microsoft.com/office/mac/drawingml/2011/main" val="1"/>
+              <ma14:placeholderFlag xmlns:ma14="http://schemas.microsoft.com/office/mac/drawingml/2011/main" xmlns="" val="1"/>
             </a:ext>
             <a:ext uri="{909E8E84-426E-40dd-AFC4-6F175D3DCCD1}">
-              <a14:hiddenFill xmlns:a14="http://schemas.microsoft.com/office/drawing/2010/main" xmlns="">
+              <a14:hiddenFill xmlns="" xmlns:a14="http://schemas.microsoft.com/office/drawing/2010/main">
                 <a:solidFill>
                   <a:srgbClr val="FFFFFF"/>
                 </a:solidFill>
               </a14:hiddenFill>
             </a:ext>
             <a:ext uri="{91240B29-F687-4f45-9708-019B960494DF}">
-              <a14:hiddenLine xmlns:a14="http://schemas.microsoft.com/office/drawing/2010/main" xmlns="" w="9525">
+              <a14:hiddenLine xmlns="" xmlns:a14="http://schemas.microsoft.com/office/drawing/2010/main" w="9525">
                 <a:solidFill>
                   <a:srgbClr val="000000"/>
                 </a:solidFill>
@@ -2731,14 +2731,14 @@
           <a:ln/>
           <a:extLst>
             <a:ext uri="{909E8E84-426E-40dd-AFC4-6F175D3DCCD1}">
-              <a14:hiddenFill xmlns:a14="http://schemas.microsoft.com/office/drawing/2010/main" xmlns="">
+              <a14:hiddenFill xmlns="" xmlns:a14="http://schemas.microsoft.com/office/drawing/2010/main">
                 <a:solidFill>
                   <a:srgbClr val="FFFFFF"/>
                 </a:solidFill>
               </a14:hiddenFill>
             </a:ext>
             <a:ext uri="{91240B29-F687-4f45-9708-019B960494DF}">
-              <a14:hiddenLine xmlns:a14="http://schemas.microsoft.com/office/drawing/2010/main" xmlns="" w="9525">
+              <a14:hiddenLine xmlns="" xmlns:a14="http://schemas.microsoft.com/office/drawing/2010/main" w="9525">
                 <a:solidFill>
                   <a:srgbClr val="000000"/>
                 </a:solidFill>
@@ -2898,17 +2898,17 @@
           <a:ln/>
           <a:extLst>
             <a:ext uri="{FAA26D3D-D897-4be2-8F04-BA451C77F1D7}">
-              <ma14:placeholderFlag xmlns="" xmlns:ma14="http://schemas.microsoft.com/office/mac/drawingml/2011/main" val="1"/>
+              <ma14:placeholderFlag xmlns:ma14="http://schemas.microsoft.com/office/mac/drawingml/2011/main" xmlns="" val="1"/>
             </a:ext>
             <a:ext uri="{909E8E84-426E-40dd-AFC4-6F175D3DCCD1}">
-              <a14:hiddenFill xmlns:a14="http://schemas.microsoft.com/office/drawing/2010/main" xmlns="">
+              <a14:hiddenFill xmlns="" xmlns:a14="http://schemas.microsoft.com/office/drawing/2010/main">
                 <a:solidFill>
                   <a:srgbClr val="FFFFFF"/>
                 </a:solidFill>
               </a14:hiddenFill>
             </a:ext>
             <a:ext uri="{91240B29-F687-4f45-9708-019B960494DF}">
-              <a14:hiddenLine xmlns:a14="http://schemas.microsoft.com/office/drawing/2010/main" xmlns="" w="9525">
+              <a14:hiddenLine xmlns="" xmlns:a14="http://schemas.microsoft.com/office/drawing/2010/main" w="9525">
                 <a:solidFill>
                   <a:srgbClr val="000000"/>
                 </a:solidFill>
@@ -3313,14 +3313,14 @@
           <a:ln/>
           <a:extLst>
             <a:ext uri="{909E8E84-426E-40dd-AFC4-6F175D3DCCD1}">
-              <a14:hiddenFill xmlns:a14="http://schemas.microsoft.com/office/drawing/2010/main" xmlns="">
+              <a14:hiddenFill xmlns="" xmlns:a14="http://schemas.microsoft.com/office/drawing/2010/main">
                 <a:solidFill>
                   <a:srgbClr val="FFFFFF"/>
                 </a:solidFill>
               </a14:hiddenFill>
             </a:ext>
             <a:ext uri="{91240B29-F687-4f45-9708-019B960494DF}">
-              <a14:hiddenLine xmlns:a14="http://schemas.microsoft.com/office/drawing/2010/main" xmlns="" w="9525">
+              <a14:hiddenLine xmlns="" xmlns:a14="http://schemas.microsoft.com/office/drawing/2010/main" w="9525">
                 <a:solidFill>
                   <a:srgbClr val="000000"/>
                 </a:solidFill>
@@ -3480,14 +3480,14 @@
           <a:ln/>
           <a:extLst>
             <a:ext uri="{909E8E84-426E-40dd-AFC4-6F175D3DCCD1}">
-              <a14:hiddenFill xmlns:a14="http://schemas.microsoft.com/office/drawing/2010/main" xmlns="">
+              <a14:hiddenFill xmlns="" xmlns:a14="http://schemas.microsoft.com/office/drawing/2010/main">
                 <a:solidFill>
                   <a:srgbClr val="FFFFFF"/>
                 </a:solidFill>
               </a14:hiddenFill>
             </a:ext>
             <a:ext uri="{91240B29-F687-4f45-9708-019B960494DF}">
-              <a14:hiddenLine xmlns:a14="http://schemas.microsoft.com/office/drawing/2010/main" xmlns="" w="9525">
+              <a14:hiddenLine xmlns="" xmlns:a14="http://schemas.microsoft.com/office/drawing/2010/main" w="9525">
                 <a:solidFill>
                   <a:srgbClr val="000000"/>
                 </a:solidFill>
@@ -3725,14 +3725,14 @@
           <a:ln/>
           <a:extLst>
             <a:ext uri="{909E8E84-426E-40dd-AFC4-6F175D3DCCD1}">
-              <a14:hiddenFill xmlns:a14="http://schemas.microsoft.com/office/drawing/2010/main" xmlns="">
+              <a14:hiddenFill xmlns="" xmlns:a14="http://schemas.microsoft.com/office/drawing/2010/main">
                 <a:solidFill>
                   <a:srgbClr val="FFFFFF"/>
                 </a:solidFill>
               </a14:hiddenFill>
             </a:ext>
             <a:ext uri="{91240B29-F687-4f45-9708-019B960494DF}">
-              <a14:hiddenLine xmlns:a14="http://schemas.microsoft.com/office/drawing/2010/main" xmlns="" w="9525">
+              <a14:hiddenLine xmlns="" xmlns:a14="http://schemas.microsoft.com/office/drawing/2010/main" w="9525">
                 <a:solidFill>
                   <a:srgbClr val="000000"/>
                 </a:solidFill>
@@ -3892,14 +3892,14 @@
           <a:ln/>
           <a:extLst>
             <a:ext uri="{909E8E84-426E-40dd-AFC4-6F175D3DCCD1}">
-              <a14:hiddenFill xmlns:a14="http://schemas.microsoft.com/office/drawing/2010/main" xmlns="">
+              <a14:hiddenFill xmlns="" xmlns:a14="http://schemas.microsoft.com/office/drawing/2010/main">
                 <a:solidFill>
                   <a:srgbClr val="FFFFFF"/>
                 </a:solidFill>
               </a14:hiddenFill>
             </a:ext>
             <a:ext uri="{91240B29-F687-4f45-9708-019B960494DF}">
-              <a14:hiddenLine xmlns:a14="http://schemas.microsoft.com/office/drawing/2010/main" xmlns="" w="9525">
+              <a14:hiddenLine xmlns="" xmlns:a14="http://schemas.microsoft.com/office/drawing/2010/main" w="9525">
                 <a:solidFill>
                   <a:srgbClr val="000000"/>
                 </a:solidFill>
@@ -3962,14 +3962,14 @@
           <a:ln/>
           <a:extLst>
             <a:ext uri="{909E8E84-426E-40dd-AFC4-6F175D3DCCD1}">
-              <a14:hiddenFill xmlns:a14="http://schemas.microsoft.com/office/drawing/2010/main" xmlns="">
+              <a14:hiddenFill xmlns="" xmlns:a14="http://schemas.microsoft.com/office/drawing/2010/main">
                 <a:solidFill>
                   <a:srgbClr val="FFFFFF"/>
                 </a:solidFill>
               </a14:hiddenFill>
             </a:ext>
             <a:ext uri="{91240B29-F687-4f45-9708-019B960494DF}">
-              <a14:hiddenLine xmlns:a14="http://schemas.microsoft.com/office/drawing/2010/main" xmlns="" w="9525">
+              <a14:hiddenLine xmlns="" xmlns:a14="http://schemas.microsoft.com/office/drawing/2010/main" w="9525">
                 <a:solidFill>
                   <a:srgbClr val="000000"/>
                 </a:solidFill>
@@ -4129,17 +4129,17 @@
           <a:ln/>
           <a:extLst>
             <a:ext uri="{FAA26D3D-D897-4be2-8F04-BA451C77F1D7}">
-              <ma14:placeholderFlag xmlns="" xmlns:ma14="http://schemas.microsoft.com/office/mac/drawingml/2011/main" val="1"/>
+              <ma14:placeholderFlag xmlns:ma14="http://schemas.microsoft.com/office/mac/drawingml/2011/main" xmlns="" val="1"/>
             </a:ext>
             <a:ext uri="{909E8E84-426E-40dd-AFC4-6F175D3DCCD1}">
-              <a14:hiddenFill xmlns:a14="http://schemas.microsoft.com/office/drawing/2010/main" xmlns="">
+              <a14:hiddenFill xmlns="" xmlns:a14="http://schemas.microsoft.com/office/drawing/2010/main">
                 <a:solidFill>
                   <a:srgbClr val="FFFFFF"/>
                 </a:solidFill>
               </a14:hiddenFill>
             </a:ext>
             <a:ext uri="{91240B29-F687-4f45-9708-019B960494DF}">
-              <a14:hiddenLine xmlns:a14="http://schemas.microsoft.com/office/drawing/2010/main" xmlns="" w="9525">
+              <a14:hiddenLine xmlns="" xmlns:a14="http://schemas.microsoft.com/office/drawing/2010/main" w="9525">
                 <a:solidFill>
                   <a:srgbClr val="000000"/>
                 </a:solidFill>
@@ -4286,14 +4286,14 @@
           <a:ln/>
           <a:extLst>
             <a:ext uri="{909E8E84-426E-40dd-AFC4-6F175D3DCCD1}">
-              <a14:hiddenFill xmlns:a14="http://schemas.microsoft.com/office/drawing/2010/main" xmlns="">
+              <a14:hiddenFill xmlns="" xmlns:a14="http://schemas.microsoft.com/office/drawing/2010/main">
                 <a:solidFill>
                   <a:srgbClr val="FFFFFF"/>
                 </a:solidFill>
               </a14:hiddenFill>
             </a:ext>
             <a:ext uri="{91240B29-F687-4f45-9708-019B960494DF}">
-              <a14:hiddenLine xmlns:a14="http://schemas.microsoft.com/office/drawing/2010/main" xmlns="" w="9525">
+              <a14:hiddenLine xmlns="" xmlns:a14="http://schemas.microsoft.com/office/drawing/2010/main" w="9525">
                 <a:solidFill>
                   <a:srgbClr val="000000"/>
                 </a:solidFill>
@@ -4453,14 +4453,14 @@
           <a:ln/>
           <a:extLst>
             <a:ext uri="{909E8E84-426E-40dd-AFC4-6F175D3DCCD1}">
-              <a14:hiddenFill xmlns:a14="http://schemas.microsoft.com/office/drawing/2010/main" xmlns="">
+              <a14:hiddenFill xmlns="" xmlns:a14="http://schemas.microsoft.com/office/drawing/2010/main">
                 <a:solidFill>
                   <a:srgbClr val="FFFFFF"/>
                 </a:solidFill>
               </a14:hiddenFill>
             </a:ext>
             <a:ext uri="{91240B29-F687-4f45-9708-019B960494DF}">
-              <a14:hiddenLine xmlns:a14="http://schemas.microsoft.com/office/drawing/2010/main" xmlns="" w="9525">
+              <a14:hiddenLine xmlns="" xmlns:a14="http://schemas.microsoft.com/office/drawing/2010/main" w="9525">
                 <a:solidFill>
                   <a:srgbClr val="000000"/>
                 </a:solidFill>
@@ -4879,14 +4879,14 @@
           <a:ln/>
           <a:extLst>
             <a:ext uri="{909E8E84-426E-40dd-AFC4-6F175D3DCCD1}">
-              <a14:hiddenFill xmlns:a14="http://schemas.microsoft.com/office/drawing/2010/main" xmlns="">
+              <a14:hiddenFill xmlns="" xmlns:a14="http://schemas.microsoft.com/office/drawing/2010/main">
                 <a:solidFill>
                   <a:srgbClr val="FFFFFF"/>
                 </a:solidFill>
               </a14:hiddenFill>
             </a:ext>
             <a:ext uri="{91240B29-F687-4f45-9708-019B960494DF}">
-              <a14:hiddenLine xmlns:a14="http://schemas.microsoft.com/office/drawing/2010/main" xmlns="" w="9525">
+              <a14:hiddenLine xmlns="" xmlns:a14="http://schemas.microsoft.com/office/drawing/2010/main" w="9525">
                 <a:solidFill>
                   <a:srgbClr val="000000"/>
                 </a:solidFill>
@@ -5046,14 +5046,14 @@
           <a:ln/>
           <a:extLst>
             <a:ext uri="{909E8E84-426E-40dd-AFC4-6F175D3DCCD1}">
-              <a14:hiddenFill xmlns:a14="http://schemas.microsoft.com/office/drawing/2010/main" xmlns="">
+              <a14:hiddenFill xmlns="" xmlns:a14="http://schemas.microsoft.com/office/drawing/2010/main">
                 <a:solidFill>
                   <a:srgbClr val="FFFFFF"/>
                 </a:solidFill>
               </a14:hiddenFill>
             </a:ext>
             <a:ext uri="{91240B29-F687-4f45-9708-019B960494DF}">
-              <a14:hiddenLine xmlns:a14="http://schemas.microsoft.com/office/drawing/2010/main" xmlns="" w="9525">
+              <a14:hiddenLine xmlns="" xmlns:a14="http://schemas.microsoft.com/office/drawing/2010/main" w="9525">
                 <a:solidFill>
                   <a:srgbClr val="000000"/>
                 </a:solidFill>
@@ -5116,14 +5116,14 @@
           <a:ln/>
           <a:extLst>
             <a:ext uri="{909E8E84-426E-40dd-AFC4-6F175D3DCCD1}">
-              <a14:hiddenFill xmlns:a14="http://schemas.microsoft.com/office/drawing/2010/main" xmlns="">
+              <a14:hiddenFill xmlns="" xmlns:a14="http://schemas.microsoft.com/office/drawing/2010/main">
                 <a:solidFill>
                   <a:srgbClr val="FFFFFF"/>
                 </a:solidFill>
               </a14:hiddenFill>
             </a:ext>
             <a:ext uri="{91240B29-F687-4f45-9708-019B960494DF}">
-              <a14:hiddenLine xmlns:a14="http://schemas.microsoft.com/office/drawing/2010/main" xmlns="" w="9525">
+              <a14:hiddenLine xmlns="" xmlns:a14="http://schemas.microsoft.com/office/drawing/2010/main" w="9525">
                 <a:solidFill>
                   <a:srgbClr val="000000"/>
                 </a:solidFill>
@@ -5283,17 +5283,17 @@
           <a:ln/>
           <a:extLst>
             <a:ext uri="{FAA26D3D-D897-4be2-8F04-BA451C77F1D7}">
-              <ma14:placeholderFlag xmlns="" xmlns:ma14="http://schemas.microsoft.com/office/mac/drawingml/2011/main" val="1"/>
+              <ma14:placeholderFlag xmlns:ma14="http://schemas.microsoft.com/office/mac/drawingml/2011/main" xmlns="" val="1"/>
             </a:ext>
             <a:ext uri="{909E8E84-426E-40dd-AFC4-6F175D3DCCD1}">
-              <a14:hiddenFill xmlns:a14="http://schemas.microsoft.com/office/drawing/2010/main" xmlns="">
+              <a14:hiddenFill xmlns="" xmlns:a14="http://schemas.microsoft.com/office/drawing/2010/main">
                 <a:solidFill>
                   <a:srgbClr val="FFFFFF"/>
                 </a:solidFill>
               </a14:hiddenFill>
             </a:ext>
             <a:ext uri="{91240B29-F687-4f45-9708-019B960494DF}">
-              <a14:hiddenLine xmlns:a14="http://schemas.microsoft.com/office/drawing/2010/main" xmlns="" w="9525">
+              <a14:hiddenLine xmlns="" xmlns:a14="http://schemas.microsoft.com/office/drawing/2010/main" w="9525">
                 <a:solidFill>
                   <a:srgbClr val="000000"/>
                 </a:solidFill>
@@ -5356,14 +5356,14 @@
           <a:ln/>
           <a:extLst>
             <a:ext uri="{909E8E84-426E-40dd-AFC4-6F175D3DCCD1}">
-              <a14:hiddenFill xmlns:a14="http://schemas.microsoft.com/office/drawing/2010/main" xmlns="">
+              <a14:hiddenFill xmlns="" xmlns:a14="http://schemas.microsoft.com/office/drawing/2010/main">
                 <a:solidFill>
                   <a:srgbClr val="FFFFFF"/>
                 </a:solidFill>
               </a14:hiddenFill>
             </a:ext>
             <a:ext uri="{91240B29-F687-4f45-9708-019B960494DF}">
-              <a14:hiddenLine xmlns:a14="http://schemas.microsoft.com/office/drawing/2010/main" xmlns="" w="9525">
+              <a14:hiddenLine xmlns="" xmlns:a14="http://schemas.microsoft.com/office/drawing/2010/main" w="9525">
                 <a:solidFill>
                   <a:srgbClr val="000000"/>
                 </a:solidFill>
@@ -5523,17 +5523,17 @@
           <a:ln/>
           <a:extLst>
             <a:ext uri="{FAA26D3D-D897-4be2-8F04-BA451C77F1D7}">
-              <ma14:placeholderFlag xmlns="" xmlns:ma14="http://schemas.microsoft.com/office/mac/drawingml/2011/main" val="1"/>
+              <ma14:placeholderFlag xmlns:ma14="http://schemas.microsoft.com/office/mac/drawingml/2011/main" xmlns="" val="1"/>
             </a:ext>
             <a:ext uri="{909E8E84-426E-40dd-AFC4-6F175D3DCCD1}">
-              <a14:hiddenFill xmlns:a14="http://schemas.microsoft.com/office/drawing/2010/main" xmlns="">
+              <a14:hiddenFill xmlns="" xmlns:a14="http://schemas.microsoft.com/office/drawing/2010/main">
                 <a:solidFill>
                   <a:srgbClr val="FFFFFF"/>
                 </a:solidFill>
               </a14:hiddenFill>
             </a:ext>
             <a:ext uri="{91240B29-F687-4f45-9708-019B960494DF}">
-              <a14:hiddenLine xmlns:a14="http://schemas.microsoft.com/office/drawing/2010/main" xmlns="" w="9525">
+              <a14:hiddenLine xmlns="" xmlns:a14="http://schemas.microsoft.com/office/drawing/2010/main" w="9525">
                 <a:solidFill>
                   <a:srgbClr val="000000"/>
                 </a:solidFill>
@@ -5596,14 +5596,14 @@
           <a:ln/>
           <a:extLst>
             <a:ext uri="{909E8E84-426E-40dd-AFC4-6F175D3DCCD1}">
-              <a14:hiddenFill xmlns:a14="http://schemas.microsoft.com/office/drawing/2010/main" xmlns="">
+              <a14:hiddenFill xmlns="" xmlns:a14="http://schemas.microsoft.com/office/drawing/2010/main">
                 <a:solidFill>
                   <a:srgbClr val="FFFFFF"/>
                 </a:solidFill>
               </a14:hiddenFill>
             </a:ext>
             <a:ext uri="{91240B29-F687-4f45-9708-019B960494DF}">
-              <a14:hiddenLine xmlns:a14="http://schemas.microsoft.com/office/drawing/2010/main" xmlns="" w="9525">
+              <a14:hiddenLine xmlns="" xmlns:a14="http://schemas.microsoft.com/office/drawing/2010/main" w="9525">
                 <a:solidFill>
                   <a:srgbClr val="000000"/>
                 </a:solidFill>
@@ -5763,17 +5763,17 @@
           <a:ln/>
           <a:extLst>
             <a:ext uri="{FAA26D3D-D897-4be2-8F04-BA451C77F1D7}">
-              <ma14:placeholderFlag xmlns="" xmlns:ma14="http://schemas.microsoft.com/office/mac/drawingml/2011/main" val="1"/>
+              <ma14:placeholderFlag xmlns:ma14="http://schemas.microsoft.com/office/mac/drawingml/2011/main" xmlns="" val="1"/>
             </a:ext>
             <a:ext uri="{909E8E84-426E-40dd-AFC4-6F175D3DCCD1}">
-              <a14:hiddenFill xmlns:a14="http://schemas.microsoft.com/office/drawing/2010/main" xmlns="">
+              <a14:hiddenFill xmlns="" xmlns:a14="http://schemas.microsoft.com/office/drawing/2010/main">
                 <a:solidFill>
                   <a:srgbClr val="FFFFFF"/>
                 </a:solidFill>
               </a14:hiddenFill>
             </a:ext>
             <a:ext uri="{91240B29-F687-4f45-9708-019B960494DF}">
-              <a14:hiddenLine xmlns:a14="http://schemas.microsoft.com/office/drawing/2010/main" xmlns="" w="9525">
+              <a14:hiddenLine xmlns="" xmlns:a14="http://schemas.microsoft.com/office/drawing/2010/main" w="9525">
                 <a:solidFill>
                   <a:srgbClr val="000000"/>
                 </a:solidFill>
@@ -5926,14 +5926,14 @@
           <a:ln/>
           <a:extLst>
             <a:ext uri="{909E8E84-426E-40dd-AFC4-6F175D3DCCD1}">
-              <a14:hiddenFill xmlns:a14="http://schemas.microsoft.com/office/drawing/2010/main" xmlns="">
+              <a14:hiddenFill xmlns="" xmlns:a14="http://schemas.microsoft.com/office/drawing/2010/main">
                 <a:solidFill>
                   <a:srgbClr val="FFFFFF"/>
                 </a:solidFill>
               </a14:hiddenFill>
             </a:ext>
             <a:ext uri="{91240B29-F687-4f45-9708-019B960494DF}">
-              <a14:hiddenLine xmlns:a14="http://schemas.microsoft.com/office/drawing/2010/main" xmlns="" w="9525">
+              <a14:hiddenLine xmlns="" xmlns:a14="http://schemas.microsoft.com/office/drawing/2010/main" w="9525">
                 <a:solidFill>
                   <a:srgbClr val="000000"/>
                 </a:solidFill>
@@ -6093,17 +6093,17 @@
           <a:ln/>
           <a:extLst>
             <a:ext uri="{FAA26D3D-D897-4be2-8F04-BA451C77F1D7}">
-              <ma14:placeholderFlag xmlns="" xmlns:ma14="http://schemas.microsoft.com/office/mac/drawingml/2011/main" val="1"/>
+              <ma14:placeholderFlag xmlns:ma14="http://schemas.microsoft.com/office/mac/drawingml/2011/main" xmlns="" val="1"/>
             </a:ext>
             <a:ext uri="{909E8E84-426E-40dd-AFC4-6F175D3DCCD1}">
-              <a14:hiddenFill xmlns:a14="http://schemas.microsoft.com/office/drawing/2010/main" xmlns="">
+              <a14:hiddenFill xmlns="" xmlns:a14="http://schemas.microsoft.com/office/drawing/2010/main">
                 <a:solidFill>
                   <a:srgbClr val="FFFFFF"/>
                 </a:solidFill>
               </a14:hiddenFill>
             </a:ext>
             <a:ext uri="{91240B29-F687-4f45-9708-019B960494DF}">
-              <a14:hiddenLine xmlns:a14="http://schemas.microsoft.com/office/drawing/2010/main" xmlns="" w="9525">
+              <a14:hiddenLine xmlns="" xmlns:a14="http://schemas.microsoft.com/office/drawing/2010/main" w="9525">
                 <a:solidFill>
                   <a:srgbClr val="000000"/>
                 </a:solidFill>
@@ -6166,14 +6166,14 @@
           <a:ln/>
           <a:extLst>
             <a:ext uri="{909E8E84-426E-40dd-AFC4-6F175D3DCCD1}">
-              <a14:hiddenFill xmlns:a14="http://schemas.microsoft.com/office/drawing/2010/main" xmlns="">
+              <a14:hiddenFill xmlns="" xmlns:a14="http://schemas.microsoft.com/office/drawing/2010/main">
                 <a:solidFill>
                   <a:srgbClr val="FFFFFF"/>
                 </a:solidFill>
               </a14:hiddenFill>
             </a:ext>
             <a:ext uri="{91240B29-F687-4f45-9708-019B960494DF}">
-              <a14:hiddenLine xmlns:a14="http://schemas.microsoft.com/office/drawing/2010/main" xmlns="" w="9525">
+              <a14:hiddenLine xmlns="" xmlns:a14="http://schemas.microsoft.com/office/drawing/2010/main" w="9525">
                 <a:solidFill>
                   <a:srgbClr val="000000"/>
                 </a:solidFill>
@@ -6333,14 +6333,14 @@
           <a:ln/>
           <a:extLst>
             <a:ext uri="{909E8E84-426E-40dd-AFC4-6F175D3DCCD1}">
-              <a14:hiddenFill xmlns:a14="http://schemas.microsoft.com/office/drawing/2010/main" xmlns="">
+              <a14:hiddenFill xmlns="" xmlns:a14="http://schemas.microsoft.com/office/drawing/2010/main">
                 <a:solidFill>
                   <a:srgbClr val="FFFFFF"/>
                 </a:solidFill>
               </a14:hiddenFill>
             </a:ext>
             <a:ext uri="{91240B29-F687-4f45-9708-019B960494DF}">
-              <a14:hiddenLine xmlns:a14="http://schemas.microsoft.com/office/drawing/2010/main" xmlns="" w="9525">
+              <a14:hiddenLine xmlns="" xmlns:a14="http://schemas.microsoft.com/office/drawing/2010/main" w="9525">
                 <a:solidFill>
                   <a:srgbClr val="000000"/>
                 </a:solidFill>
@@ -6403,14 +6403,14 @@
           <a:ln/>
           <a:extLst>
             <a:ext uri="{909E8E84-426E-40dd-AFC4-6F175D3DCCD1}">
-              <a14:hiddenFill xmlns:a14="http://schemas.microsoft.com/office/drawing/2010/main" xmlns="">
+              <a14:hiddenFill xmlns="" xmlns:a14="http://schemas.microsoft.com/office/drawing/2010/main">
                 <a:solidFill>
                   <a:srgbClr val="FFFFFF"/>
                 </a:solidFill>
               </a14:hiddenFill>
             </a:ext>
             <a:ext uri="{91240B29-F687-4f45-9708-019B960494DF}">
-              <a14:hiddenLine xmlns:a14="http://schemas.microsoft.com/office/drawing/2010/main" xmlns="" w="9525">
+              <a14:hiddenLine xmlns="" xmlns:a14="http://schemas.microsoft.com/office/drawing/2010/main" w="9525">
                 <a:solidFill>
                   <a:srgbClr val="000000"/>
                 </a:solidFill>
@@ -6570,17 +6570,17 @@
           <a:ln/>
           <a:extLst>
             <a:ext uri="{FAA26D3D-D897-4be2-8F04-BA451C77F1D7}">
-              <ma14:placeholderFlag xmlns="" xmlns:ma14="http://schemas.microsoft.com/office/mac/drawingml/2011/main" val="1"/>
+              <ma14:placeholderFlag xmlns:ma14="http://schemas.microsoft.com/office/mac/drawingml/2011/main" xmlns="" val="1"/>
             </a:ext>
             <a:ext uri="{909E8E84-426E-40dd-AFC4-6F175D3DCCD1}">
-              <a14:hiddenFill xmlns:a14="http://schemas.microsoft.com/office/drawing/2010/main" xmlns="">
+              <a14:hiddenFill xmlns="" xmlns:a14="http://schemas.microsoft.com/office/drawing/2010/main">
                 <a:solidFill>
                   <a:srgbClr val="FFFFFF"/>
                 </a:solidFill>
               </a14:hiddenFill>
             </a:ext>
             <a:ext uri="{91240B29-F687-4f45-9708-019B960494DF}">
-              <a14:hiddenLine xmlns:a14="http://schemas.microsoft.com/office/drawing/2010/main" xmlns="" w="9525">
+              <a14:hiddenLine xmlns="" xmlns:a14="http://schemas.microsoft.com/office/drawing/2010/main" w="9525">
                 <a:solidFill>
                   <a:srgbClr val="000000"/>
                 </a:solidFill>
@@ -6643,14 +6643,14 @@
           <a:ln/>
           <a:extLst>
             <a:ext uri="{909E8E84-426E-40dd-AFC4-6F175D3DCCD1}">
-              <a14:hiddenFill xmlns:a14="http://schemas.microsoft.com/office/drawing/2010/main" xmlns="">
+              <a14:hiddenFill xmlns="" xmlns:a14="http://schemas.microsoft.com/office/drawing/2010/main">
                 <a:solidFill>
                   <a:srgbClr val="FFFFFF"/>
                 </a:solidFill>
               </a14:hiddenFill>
             </a:ext>
             <a:ext uri="{91240B29-F687-4f45-9708-019B960494DF}">
-              <a14:hiddenLine xmlns:a14="http://schemas.microsoft.com/office/drawing/2010/main" xmlns="" w="9525">
+              <a14:hiddenLine xmlns="" xmlns:a14="http://schemas.microsoft.com/office/drawing/2010/main" w="9525">
                 <a:solidFill>
                   <a:srgbClr val="000000"/>
                 </a:solidFill>
@@ -6810,17 +6810,17 @@
           <a:ln/>
           <a:extLst>
             <a:ext uri="{FAA26D3D-D897-4be2-8F04-BA451C77F1D7}">
-              <ma14:placeholderFlag xmlns="" xmlns:ma14="http://schemas.microsoft.com/office/mac/drawingml/2011/main" val="1"/>
+              <ma14:placeholderFlag xmlns:ma14="http://schemas.microsoft.com/office/mac/drawingml/2011/main" xmlns="" val="1"/>
             </a:ext>
             <a:ext uri="{909E8E84-426E-40dd-AFC4-6F175D3DCCD1}">
-              <a14:hiddenFill xmlns:a14="http://schemas.microsoft.com/office/drawing/2010/main" xmlns="">
+              <a14:hiddenFill xmlns="" xmlns:a14="http://schemas.microsoft.com/office/drawing/2010/main">
                 <a:solidFill>
                   <a:srgbClr val="FFFFFF"/>
                 </a:solidFill>
               </a14:hiddenFill>
             </a:ext>
             <a:ext uri="{91240B29-F687-4f45-9708-019B960494DF}">
-              <a14:hiddenLine xmlns:a14="http://schemas.microsoft.com/office/drawing/2010/main" xmlns="" w="9525">
+              <a14:hiddenLine xmlns="" xmlns:a14="http://schemas.microsoft.com/office/drawing/2010/main" w="9525">
                 <a:solidFill>
                   <a:srgbClr val="000000"/>
                 </a:solidFill>
@@ -6973,14 +6973,14 @@
           <a:ln/>
           <a:extLst>
             <a:ext uri="{909E8E84-426E-40dd-AFC4-6F175D3DCCD1}">
-              <a14:hiddenFill xmlns:a14="http://schemas.microsoft.com/office/drawing/2010/main" xmlns="">
+              <a14:hiddenFill xmlns="" xmlns:a14="http://schemas.microsoft.com/office/drawing/2010/main">
                 <a:solidFill>
                   <a:srgbClr val="FFFFFF"/>
                 </a:solidFill>
               </a14:hiddenFill>
             </a:ext>
             <a:ext uri="{91240B29-F687-4f45-9708-019B960494DF}">
-              <a14:hiddenLine xmlns:a14="http://schemas.microsoft.com/office/drawing/2010/main" xmlns="" w="9525">
+              <a14:hiddenLine xmlns="" xmlns:a14="http://schemas.microsoft.com/office/drawing/2010/main" w="9525">
                 <a:solidFill>
                   <a:srgbClr val="000000"/>
                 </a:solidFill>
@@ -7140,14 +7140,14 @@
           <a:ln/>
           <a:extLst>
             <a:ext uri="{909E8E84-426E-40dd-AFC4-6F175D3DCCD1}">
-              <a14:hiddenFill xmlns:a14="http://schemas.microsoft.com/office/drawing/2010/main" xmlns="">
+              <a14:hiddenFill xmlns="" xmlns:a14="http://schemas.microsoft.com/office/drawing/2010/main">
                 <a:solidFill>
                   <a:srgbClr val="FFFFFF"/>
                 </a:solidFill>
               </a14:hiddenFill>
             </a:ext>
             <a:ext uri="{91240B29-F687-4f45-9708-019B960494DF}">
-              <a14:hiddenLine xmlns:a14="http://schemas.microsoft.com/office/drawing/2010/main" xmlns="" w="9525">
+              <a14:hiddenLine xmlns="" xmlns:a14="http://schemas.microsoft.com/office/drawing/2010/main" w="9525">
                 <a:solidFill>
                   <a:srgbClr val="000000"/>
                 </a:solidFill>
@@ -7669,14 +7669,14 @@
           <a:ln/>
           <a:extLst>
             <a:ext uri="{909E8E84-426E-40dd-AFC4-6F175D3DCCD1}">
-              <a14:hiddenFill xmlns:a14="http://schemas.microsoft.com/office/drawing/2010/main" xmlns="">
+              <a14:hiddenFill xmlns="" xmlns:a14="http://schemas.microsoft.com/office/drawing/2010/main">
                 <a:solidFill>
                   <a:srgbClr val="FFFFFF"/>
                 </a:solidFill>
               </a14:hiddenFill>
             </a:ext>
             <a:ext uri="{91240B29-F687-4f45-9708-019B960494DF}">
-              <a14:hiddenLine xmlns:a14="http://schemas.microsoft.com/office/drawing/2010/main" xmlns="" w="9525">
+              <a14:hiddenLine xmlns="" xmlns:a14="http://schemas.microsoft.com/office/drawing/2010/main" w="9525">
                 <a:solidFill>
                   <a:srgbClr val="000000"/>
                 </a:solidFill>
@@ -7836,14 +7836,14 @@
           <a:ln/>
           <a:extLst>
             <a:ext uri="{909E8E84-426E-40dd-AFC4-6F175D3DCCD1}">
-              <a14:hiddenFill xmlns:a14="http://schemas.microsoft.com/office/drawing/2010/main" xmlns="">
+              <a14:hiddenFill xmlns="" xmlns:a14="http://schemas.microsoft.com/office/drawing/2010/main">
                 <a:solidFill>
                   <a:srgbClr val="FFFFFF"/>
                 </a:solidFill>
               </a14:hiddenFill>
             </a:ext>
             <a:ext uri="{91240B29-F687-4f45-9708-019B960494DF}">
-              <a14:hiddenLine xmlns:a14="http://schemas.microsoft.com/office/drawing/2010/main" xmlns="" w="9525">
+              <a14:hiddenLine xmlns="" xmlns:a14="http://schemas.microsoft.com/office/drawing/2010/main" w="9525">
                 <a:solidFill>
                   <a:srgbClr val="000000"/>
                 </a:solidFill>
@@ -9695,7 +9695,7 @@
               </a14:hiddenLine>
             </a:ext>
             <a:ext uri="{FAA26D3D-D897-4be2-8F04-BA451C77F1D7}">
-              <ma14:placeholderFlag xmlns="" xmlns:ma14="http://schemas.microsoft.com/office/mac/drawingml/2011/main" val="1"/>
+              <ma14:placeholderFlag xmlns:ma14="http://schemas.microsoft.com/office/mac/drawingml/2011/main" xmlns="" val="1"/>
             </a:ext>
           </a:extLst>
         </p:spPr>
@@ -9756,7 +9756,7 @@
               </a14:hiddenLine>
             </a:ext>
             <a:ext uri="{FAA26D3D-D897-4be2-8F04-BA451C77F1D7}">
-              <ma14:placeholderFlag xmlns="" xmlns:ma14="http://schemas.microsoft.com/office/mac/drawingml/2011/main" val="1"/>
+              <ma14:placeholderFlag xmlns:ma14="http://schemas.microsoft.com/office/mac/drawingml/2011/main" xmlns="" val="1"/>
             </a:ext>
           </a:extLst>
         </p:spPr>
@@ -26457,14 +26457,14 @@
           </a:ln>
           <a:extLst>
             <a:ext uri="{909E8E84-426E-40dd-AFC4-6F175D3DCCD1}">
-              <a14:hiddenFill xmlns:a14="http://schemas.microsoft.com/office/drawing/2010/main" xmlns="">
+              <a14:hiddenFill xmlns="" xmlns:a14="http://schemas.microsoft.com/office/drawing/2010/main">
                 <a:solidFill>
                   <a:srgbClr val="FFFFFF"/>
                 </a:solidFill>
               </a14:hiddenFill>
             </a:ext>
             <a:ext uri="{91240B29-F687-4f45-9708-019B960494DF}">
-              <a14:hiddenLine xmlns:a14="http://schemas.microsoft.com/office/drawing/2010/main" xmlns="" w="9525">
+              <a14:hiddenLine xmlns="" xmlns:a14="http://schemas.microsoft.com/office/drawing/2010/main" w="9525">
                 <a:solidFill>
                   <a:srgbClr val="000000"/>
                 </a:solidFill>
@@ -26801,7 +26801,7 @@
         <p:spPr/>
         <p:txBody>
           <a:bodyPr>
-            <a:normAutofit fontScale="92500" lnSpcReduction="10000"/>
+            <a:normAutofit lnSpcReduction="10000"/>
           </a:bodyPr>
           <a:lstStyle/>
           <a:p>
@@ -26865,23 +26865,17 @@
                 <a:ea typeface="ＭＳ Ｐゴシック" charset="0"/>
                 <a:cs typeface="ＭＳ Ｐゴシック" charset="0"/>
               </a:rPr>
-              <a:t>Scales to track progress: most widely used is the Rancho Los Amigos Levels of Cognitive Functioning</a:t>
-            </a:r>
-          </a:p>
-          <a:p>
-            <a:pPr lvl="1">
-              <a:defRPr/>
-            </a:pPr>
-            <a:r>
-              <a:rPr lang="en-US" sz="2600">
+              <a:t>Scales to track progress: most widely used is the Rancho Los Amigos Levels of </a:t>
+            </a:r>
+            <a:r>
+              <a:rPr lang="en-US" sz="2800">
                 <a:latin typeface="Arial" charset="0"/>
                 <a:ea typeface="ＭＳ Ｐゴシック" charset="0"/>
                 <a:cs typeface="ＭＳ Ｐゴシック" charset="0"/>
-                <a:hlinkClick r:id="rId3"/>
               </a:rPr>
-              <a:t>Weird video describing RLA levels</a:t>
-            </a:r>
-            <a:endParaRPr lang="en-US" sz="2600">
+              <a:t>Cognitive Functioning</a:t>
+            </a:r>
+            <a:endParaRPr lang="en-US" sz="2800" dirty="0">
               <a:latin typeface="Arial" charset="0"/>
               <a:ea typeface="ＭＳ Ｐゴシック" charset="0"/>
               <a:cs typeface="ＭＳ Ｐゴシック" charset="0"/>

</xml_diff>